<commit_message>
Updated personal website template
</commit_message>
<xml_diff>
--- a/WebDesign/marvel-api/images/PersonalWebsite.pptx
+++ b/WebDesign/marvel-api/images/PersonalWebsite.pptx
@@ -6,10 +6,11 @@
   </p:sldMasterIdLst>
   <p:sldIdLst>
     <p:sldId id="260" r:id="rId2"/>
-    <p:sldId id="261" r:id="rId3"/>
-    <p:sldId id="259" r:id="rId4"/>
-    <p:sldId id="257" r:id="rId5"/>
-    <p:sldId id="258" r:id="rId6"/>
+    <p:sldId id="262" r:id="rId3"/>
+    <p:sldId id="261" r:id="rId4"/>
+    <p:sldId id="259" r:id="rId5"/>
+    <p:sldId id="257" r:id="rId6"/>
+    <p:sldId id="258" r:id="rId7"/>
   </p:sldIdLst>
   <p:sldSz cx="6858000" cy="9144000" type="screen4x3"/>
   <p:notesSz cx="6858000" cy="9144000"/>
@@ -247,7 +248,7 @@
           <a:p>
             <a:fld id="{E5D08335-CFB3-1C44-B073-E0F5C021828F}" type="datetimeFigureOut">
               <a:rPr lang="en-US" smtClean="0"/>
-              <a:t>10/20/19</a:t>
+              <a:t>10/21/2019</a:t>
             </a:fld>
             <a:endParaRPr lang="en-US"/>
           </a:p>
@@ -417,7 +418,7 @@
           <a:p>
             <a:fld id="{E5D08335-CFB3-1C44-B073-E0F5C021828F}" type="datetimeFigureOut">
               <a:rPr lang="en-US" smtClean="0"/>
-              <a:t>10/20/19</a:t>
+              <a:t>10/21/2019</a:t>
             </a:fld>
             <a:endParaRPr lang="en-US"/>
           </a:p>
@@ -597,7 +598,7 @@
           <a:p>
             <a:fld id="{E5D08335-CFB3-1C44-B073-E0F5C021828F}" type="datetimeFigureOut">
               <a:rPr lang="en-US" smtClean="0"/>
-              <a:t>10/20/19</a:t>
+              <a:t>10/21/2019</a:t>
             </a:fld>
             <a:endParaRPr lang="en-US"/>
           </a:p>
@@ -767,7 +768,7 @@
           <a:p>
             <a:fld id="{E5D08335-CFB3-1C44-B073-E0F5C021828F}" type="datetimeFigureOut">
               <a:rPr lang="en-US" smtClean="0"/>
-              <a:t>10/20/19</a:t>
+              <a:t>10/21/2019</a:t>
             </a:fld>
             <a:endParaRPr lang="en-US"/>
           </a:p>
@@ -1011,7 +1012,7 @@
           <a:p>
             <a:fld id="{E5D08335-CFB3-1C44-B073-E0F5C021828F}" type="datetimeFigureOut">
               <a:rPr lang="en-US" smtClean="0"/>
-              <a:t>10/20/19</a:t>
+              <a:t>10/21/2019</a:t>
             </a:fld>
             <a:endParaRPr lang="en-US"/>
           </a:p>
@@ -1243,7 +1244,7 @@
           <a:p>
             <a:fld id="{E5D08335-CFB3-1C44-B073-E0F5C021828F}" type="datetimeFigureOut">
               <a:rPr lang="en-US" smtClean="0"/>
-              <a:t>10/20/19</a:t>
+              <a:t>10/21/2019</a:t>
             </a:fld>
             <a:endParaRPr lang="en-US"/>
           </a:p>
@@ -1610,7 +1611,7 @@
           <a:p>
             <a:fld id="{E5D08335-CFB3-1C44-B073-E0F5C021828F}" type="datetimeFigureOut">
               <a:rPr lang="en-US" smtClean="0"/>
-              <a:t>10/20/19</a:t>
+              <a:t>10/21/2019</a:t>
             </a:fld>
             <a:endParaRPr lang="en-US"/>
           </a:p>
@@ -1728,7 +1729,7 @@
           <a:p>
             <a:fld id="{E5D08335-CFB3-1C44-B073-E0F5C021828F}" type="datetimeFigureOut">
               <a:rPr lang="en-US" smtClean="0"/>
-              <a:t>10/20/19</a:t>
+              <a:t>10/21/2019</a:t>
             </a:fld>
             <a:endParaRPr lang="en-US"/>
           </a:p>
@@ -1823,7 +1824,7 @@
           <a:p>
             <a:fld id="{E5D08335-CFB3-1C44-B073-E0F5C021828F}" type="datetimeFigureOut">
               <a:rPr lang="en-US" smtClean="0"/>
-              <a:t>10/20/19</a:t>
+              <a:t>10/21/2019</a:t>
             </a:fld>
             <a:endParaRPr lang="en-US"/>
           </a:p>
@@ -2100,7 +2101,7 @@
           <a:p>
             <a:fld id="{E5D08335-CFB3-1C44-B073-E0F5C021828F}" type="datetimeFigureOut">
               <a:rPr lang="en-US" smtClean="0"/>
-              <a:t>10/20/19</a:t>
+              <a:t>10/21/2019</a:t>
             </a:fld>
             <a:endParaRPr lang="en-US"/>
           </a:p>
@@ -2357,7 +2358,7 @@
           <a:p>
             <a:fld id="{E5D08335-CFB3-1C44-B073-E0F5C021828F}" type="datetimeFigureOut">
               <a:rPr lang="en-US" smtClean="0"/>
-              <a:t>10/20/19</a:t>
+              <a:t>10/21/2019</a:t>
             </a:fld>
             <a:endParaRPr lang="en-US"/>
           </a:p>
@@ -2570,7 +2571,7 @@
           <a:p>
             <a:fld id="{E5D08335-CFB3-1C44-B073-E0F5C021828F}" type="datetimeFigureOut">
               <a:rPr lang="en-US" smtClean="0"/>
-              <a:t>10/20/19</a:t>
+              <a:t>10/21/2019</a:t>
             </a:fld>
             <a:endParaRPr lang="en-US"/>
           </a:p>
@@ -2997,7 +2998,7 @@
         </p:nvSpPr>
         <p:spPr>
           <a:xfrm>
-            <a:off x="2614232" y="5093685"/>
+            <a:off x="2609828" y="5093685"/>
             <a:ext cx="1638344" cy="1950126"/>
           </a:xfrm>
           <a:prstGeom prst="roundRect">
@@ -3006,7 +3007,7 @@
             </a:avLst>
           </a:prstGeom>
           <a:solidFill>
-            <a:srgbClr val="A5BCC3"/>
+            <a:srgbClr val="1F222A"/>
           </a:solidFill>
           <a:ln>
             <a:solidFill>
@@ -3062,7 +3063,7 @@
             </a:avLst>
           </a:prstGeom>
           <a:solidFill>
-            <a:srgbClr val="A5BCC3"/>
+            <a:srgbClr val="1F222A"/>
           </a:solidFill>
           <a:ln>
             <a:solidFill>
@@ -3118,7 +3119,7 @@
             </a:avLst>
           </a:prstGeom>
           <a:solidFill>
-            <a:srgbClr val="A5BCC3"/>
+            <a:srgbClr val="1F222A"/>
           </a:solidFill>
           <a:ln>
             <a:solidFill>
@@ -3872,8 +3873,8 @@
         </p:nvSpPr>
         <p:spPr>
           <a:xfrm>
-            <a:off x="888398" y="6684861"/>
-            <a:ext cx="901209" cy="369332"/>
+            <a:off x="1197603" y="6598182"/>
+            <a:ext cx="910827" cy="369332"/>
           </a:xfrm>
           <a:prstGeom prst="rect">
             <a:avLst/>
@@ -3889,7 +3890,7 @@
             <a:r>
               <a:rPr lang="en-US" b="1" dirty="0">
                 <a:solidFill>
-                  <a:srgbClr val="1F222A"/>
+                  <a:srgbClr val="D9E0E2"/>
                 </a:solidFill>
                 <a:latin typeface="Reliable DEMO" panose="02000506000000020004" pitchFamily="2" charset="0"/>
                 <a:ea typeface="Karla" pitchFamily="2" charset="0"/>
@@ -3913,8 +3914,8 @@
         </p:nvSpPr>
         <p:spPr>
           <a:xfrm>
-            <a:off x="2637034" y="6674479"/>
-            <a:ext cx="1051891" cy="369332"/>
+            <a:off x="2881378" y="6597485"/>
+            <a:ext cx="1064715" cy="369332"/>
           </a:xfrm>
           <a:prstGeom prst="rect">
             <a:avLst/>
@@ -3930,7 +3931,7 @@
             <a:r>
               <a:rPr lang="en-US" b="1" dirty="0">
                 <a:solidFill>
-                  <a:srgbClr val="1F222A"/>
+                  <a:srgbClr val="D9E0E2"/>
                 </a:solidFill>
                 <a:latin typeface="Reliable DEMO" panose="02000506000000020004" pitchFamily="2" charset="0"/>
                 <a:ea typeface="Karla" pitchFamily="2" charset="0"/>
@@ -3954,8 +3955,8 @@
         </p:nvSpPr>
         <p:spPr>
           <a:xfrm>
-            <a:off x="4367201" y="6403744"/>
-            <a:ext cx="1151277" cy="646331"/>
+            <a:off x="4754932" y="6597485"/>
+            <a:ext cx="801823" cy="369332"/>
           </a:xfrm>
           <a:prstGeom prst="rect">
             <a:avLst/>
@@ -3971,24 +3972,12 @@
             <a:r>
               <a:rPr lang="en-US" b="1" dirty="0">
                 <a:solidFill>
-                  <a:srgbClr val="1F222A"/>
+                  <a:srgbClr val="D9E0E2"/>
                 </a:solidFill>
                 <a:latin typeface="Reliable DEMO" panose="02000506000000020004" pitchFamily="2" charset="0"/>
                 <a:ea typeface="Karla" pitchFamily="2" charset="0"/>
               </a:rPr>
               <a:t>Social</a:t>
-            </a:r>
-          </a:p>
-          <a:p>
-            <a:r>
-              <a:rPr lang="en-US" b="1" dirty="0">
-                <a:solidFill>
-                  <a:srgbClr val="1F222A"/>
-                </a:solidFill>
-                <a:latin typeface="Reliable DEMO" panose="02000506000000020004" pitchFamily="2" charset="0"/>
-                <a:ea typeface="Karla" pitchFamily="2" charset="0"/>
-              </a:rPr>
-              <a:t>Networks</a:t>
             </a:r>
           </a:p>
         </p:txBody>
@@ -4047,7 +4036,7 @@
             <a:r>
               <a:rPr lang="en-US" sz="900" dirty="0">
                 <a:solidFill>
-                  <a:srgbClr val="A5BCC3"/>
+                  <a:srgbClr val="8F9294"/>
                 </a:solidFill>
                 <a:latin typeface="Karla" pitchFamily="2" charset="0"/>
                 <a:ea typeface="Karla" pitchFamily="2" charset="0"/>
@@ -4098,7 +4087,7 @@
               <a:avLst/>
             </a:prstGeom>
             <a:solidFill>
-              <a:srgbClr val="A5BCC3"/>
+              <a:srgbClr val="8F9294"/>
             </a:solidFill>
             <a:ln>
               <a:noFill/>
@@ -4125,7 +4114,11 @@
             <a:lstStyle/>
             <a:p>
               <a:pPr algn="ctr"/>
-              <a:endParaRPr lang="en-US"/>
+              <a:endParaRPr lang="en-US" dirty="0">
+                <a:solidFill>
+                  <a:srgbClr val="8F9294"/>
+                </a:solidFill>
+              </a:endParaRPr>
             </a:p>
           </p:txBody>
         </p:sp>
@@ -4479,8 +4472,8 @@
         </p:blipFill>
         <p:spPr>
           <a:xfrm>
-            <a:off x="5182331" y="5320847"/>
-            <a:ext cx="528702" cy="528702"/>
+            <a:off x="5192781" y="5429105"/>
+            <a:ext cx="399922" cy="399922"/>
           </a:xfrm>
           <a:prstGeom prst="rect">
             <a:avLst/>
@@ -4509,8 +4502,8 @@
         </p:blipFill>
         <p:spPr>
           <a:xfrm>
-            <a:off x="5182331" y="5887413"/>
-            <a:ext cx="528702" cy="528702"/>
+            <a:off x="5192781" y="5915931"/>
+            <a:ext cx="399922" cy="399922"/>
           </a:xfrm>
           <a:prstGeom prst="rect">
             <a:avLst/>
@@ -4539,8 +4532,8 @@
         </p:blipFill>
         <p:spPr>
           <a:xfrm>
-            <a:off x="4570220" y="5896885"/>
-            <a:ext cx="528702" cy="528702"/>
+            <a:off x="4704359" y="5915931"/>
+            <a:ext cx="399922" cy="399922"/>
           </a:xfrm>
           <a:prstGeom prst="rect">
             <a:avLst/>
@@ -4569,8 +4562,8 @@
         </p:blipFill>
         <p:spPr>
           <a:xfrm>
-            <a:off x="4570220" y="5303487"/>
-            <a:ext cx="528702" cy="528702"/>
+            <a:off x="4710185" y="5435237"/>
+            <a:ext cx="399922" cy="399922"/>
           </a:xfrm>
           <a:prstGeom prst="rect">
             <a:avLst/>
@@ -4629,8 +4622,8 @@
         </p:blipFill>
         <p:spPr>
           <a:xfrm>
-            <a:off x="1197603" y="5297270"/>
-            <a:ext cx="1184007" cy="1184007"/>
+            <a:off x="1248204" y="5373697"/>
+            <a:ext cx="1051890" cy="1051890"/>
           </a:xfrm>
           <a:prstGeom prst="rect">
             <a:avLst/>
@@ -4677,10 +4670,10 @@
       </p:grpSpPr>
       <p:sp>
         <p:nvSpPr>
-          <p:cNvPr id="4" name="Rectangle 3">
+          <p:cNvPr id="60" name="Rounded Rectangle 59">
             <a:extLst>
               <a:ext uri="{FF2B5EF4-FFF2-40B4-BE49-F238E27FC236}">
-                <a16:creationId xmlns:a16="http://schemas.microsoft.com/office/drawing/2014/main" id="{27F93F16-1B53-DD4E-9375-A52485D54031}"/>
+                <a16:creationId xmlns:a16="http://schemas.microsoft.com/office/drawing/2014/main" id="{484E11E5-5142-CE47-B13C-AE6E08FF7908}"/>
               </a:ext>
             </a:extLst>
           </p:cNvPr>
@@ -4689,14 +4682,16 @@
         </p:nvSpPr>
         <p:spPr>
           <a:xfrm>
-            <a:off x="0" y="0"/>
-            <a:ext cx="6858000" cy="361594"/>
-          </a:xfrm>
-          <a:prstGeom prst="rect">
-            <a:avLst/>
+            <a:off x="2609828" y="5093685"/>
+            <a:ext cx="1638344" cy="1950126"/>
+          </a:xfrm>
+          <a:prstGeom prst="roundRect">
+            <a:avLst>
+              <a:gd name="adj" fmla="val 0"/>
+            </a:avLst>
           </a:prstGeom>
           <a:solidFill>
-            <a:srgbClr val="1F222A"/>
+            <a:srgbClr val="8F9294"/>
           </a:solidFill>
           <a:ln>
             <a:noFill/>
@@ -4723,16 +4718,16 @@
           <a:lstStyle/>
           <a:p>
             <a:pPr algn="ctr"/>
-            <a:endParaRPr lang="en-US" sz="2400"/>
-          </a:p>
-        </p:txBody>
-      </p:sp>
-      <p:sp>
-        <p:nvSpPr>
-          <p:cNvPr id="6" name="Rounded Rectangle 5">
+            <a:endParaRPr lang="en-US"/>
+          </a:p>
+        </p:txBody>
+      </p:sp>
+      <p:sp>
+        <p:nvSpPr>
+          <p:cNvPr id="61" name="Rounded Rectangle 60">
             <a:extLst>
               <a:ext uri="{FF2B5EF4-FFF2-40B4-BE49-F238E27FC236}">
-                <a16:creationId xmlns:a16="http://schemas.microsoft.com/office/drawing/2014/main" id="{90CB2AE9-FA5C-2248-A481-590F385790EF}"/>
+                <a16:creationId xmlns:a16="http://schemas.microsoft.com/office/drawing/2014/main" id="{76956423-FCD5-C948-BA4C-77731B551433}"/>
               </a:ext>
             </a:extLst>
           </p:cNvPr>
@@ -4741,16 +4736,16 @@
         </p:nvSpPr>
         <p:spPr>
           <a:xfrm>
-            <a:off x="2697809" y="4483155"/>
-            <a:ext cx="1462378" cy="409355"/>
+            <a:off x="4262198" y="5093685"/>
+            <a:ext cx="1638344" cy="1950126"/>
           </a:xfrm>
           <a:prstGeom prst="roundRect">
             <a:avLst>
-              <a:gd name="adj" fmla="val 50000"/>
+              <a:gd name="adj" fmla="val 0"/>
             </a:avLst>
           </a:prstGeom>
           <a:solidFill>
-            <a:srgbClr val="1F222A"/>
+            <a:srgbClr val="8F9294"/>
           </a:solidFill>
           <a:ln>
             <a:noFill/>
@@ -4777,36 +4772,16 @@
           <a:lstStyle/>
           <a:p>
             <a:pPr algn="ctr"/>
-            <a:r>
-              <a:rPr lang="en-US" sz="1600" dirty="0">
-                <a:latin typeface="AweSomE JouRneY" panose="02000600000000000000" pitchFamily="2" charset="0"/>
-              </a:rPr>
-              <a:t>Say</a:t>
-            </a:r>
-            <a:r>
-              <a:rPr lang="en-US" sz="1200" dirty="0">
-                <a:latin typeface="AweSomE JouRneY" panose="02000600000000000000" pitchFamily="2" charset="0"/>
-              </a:rPr>
-              <a:t> </a:t>
-            </a:r>
-            <a:r>
-              <a:rPr lang="en-US" sz="1600" dirty="0">
-                <a:latin typeface="AweSomE JouRneY" panose="02000600000000000000" pitchFamily="2" charset="0"/>
-              </a:rPr>
-              <a:t>Hello</a:t>
-            </a:r>
-            <a:endParaRPr lang="en-US" sz="1200" dirty="0">
-              <a:latin typeface="AweSomE JouRneY" panose="02000600000000000000" pitchFamily="2" charset="0"/>
-            </a:endParaRPr>
-          </a:p>
-        </p:txBody>
-      </p:sp>
-      <p:sp>
-        <p:nvSpPr>
-          <p:cNvPr id="9" name="Rectangle 8">
+            <a:endParaRPr lang="en-US"/>
+          </a:p>
+        </p:txBody>
+      </p:sp>
+      <p:sp>
+        <p:nvSpPr>
+          <p:cNvPr id="59" name="Rounded Rectangle 58">
             <a:extLst>
               <a:ext uri="{FF2B5EF4-FFF2-40B4-BE49-F238E27FC236}">
-                <a16:creationId xmlns:a16="http://schemas.microsoft.com/office/drawing/2014/main" id="{5DF16F49-D792-D64B-B02C-BA63E4CDD8E7}"/>
+                <a16:creationId xmlns:a16="http://schemas.microsoft.com/office/drawing/2014/main" id="{AC89BE4E-B5C5-BA49-99E1-E4780C13D5EB}"/>
               </a:ext>
             </a:extLst>
           </p:cNvPr>
@@ -4815,19 +4790,19 @@
         </p:nvSpPr>
         <p:spPr>
           <a:xfrm>
-            <a:off x="888079" y="5093685"/>
+            <a:off x="957458" y="5093685"/>
             <a:ext cx="1638344" cy="1950126"/>
           </a:xfrm>
-          <a:prstGeom prst="rect">
-            <a:avLst/>
+          <a:prstGeom prst="roundRect">
+            <a:avLst>
+              <a:gd name="adj" fmla="val 0"/>
+            </a:avLst>
           </a:prstGeom>
           <a:solidFill>
             <a:srgbClr val="8F9294"/>
           </a:solidFill>
           <a:ln>
-            <a:solidFill>
-              <a:srgbClr val="8F9294"/>
-            </a:solidFill>
+            <a:noFill/>
           </a:ln>
         </p:spPr>
         <p:style>
@@ -4847,16 +4822,137 @@
           </a:fontRef>
         </p:style>
         <p:txBody>
-          <a:bodyPr rot="0" spcFirstLastPara="0" vertOverflow="overflow" horzOverflow="overflow" vert="horz" wrap="square" lIns="68598" tIns="34299" rIns="68598" bIns="34299" numCol="1" spcCol="0" rtlCol="0" fromWordArt="0" anchor="ctr" anchorCtr="0" forceAA="0" compatLnSpc="1">
-            <a:prstTxWarp prst="textNoShape">
-              <a:avLst/>
-            </a:prstTxWarp>
-            <a:noAutofit/>
-          </a:bodyPr>
+          <a:bodyPr rtlCol="0" anchor="ctr"/>
           <a:lstStyle/>
           <a:p>
             <a:pPr algn="ctr"/>
-            <a:endParaRPr lang="en-US" sz="1350"/>
+            <a:endParaRPr lang="en-US"/>
+          </a:p>
+        </p:txBody>
+      </p:sp>
+      <p:sp>
+        <p:nvSpPr>
+          <p:cNvPr id="4" name="Rectangle 3">
+            <a:extLst>
+              <a:ext uri="{FF2B5EF4-FFF2-40B4-BE49-F238E27FC236}">
+                <a16:creationId xmlns:a16="http://schemas.microsoft.com/office/drawing/2014/main" id="{27F93F16-1B53-DD4E-9375-A52485D54031}"/>
+              </a:ext>
+            </a:extLst>
+          </p:cNvPr>
+          <p:cNvSpPr/>
+          <p:nvPr/>
+        </p:nvSpPr>
+        <p:spPr>
+          <a:xfrm>
+            <a:off x="0" y="0"/>
+            <a:ext cx="6858000" cy="361594"/>
+          </a:xfrm>
+          <a:prstGeom prst="rect">
+            <a:avLst/>
+          </a:prstGeom>
+          <a:solidFill>
+            <a:srgbClr val="1F222A"/>
+          </a:solidFill>
+          <a:ln>
+            <a:noFill/>
+          </a:ln>
+        </p:spPr>
+        <p:style>
+          <a:lnRef idx="2">
+            <a:schemeClr val="accent1">
+              <a:shade val="50000"/>
+            </a:schemeClr>
+          </a:lnRef>
+          <a:fillRef idx="1">
+            <a:schemeClr val="accent1"/>
+          </a:fillRef>
+          <a:effectRef idx="0">
+            <a:schemeClr val="accent1"/>
+          </a:effectRef>
+          <a:fontRef idx="minor">
+            <a:schemeClr val="lt1"/>
+          </a:fontRef>
+        </p:style>
+        <p:txBody>
+          <a:bodyPr rtlCol="0" anchor="ctr"/>
+          <a:lstStyle/>
+          <a:p>
+            <a:pPr algn="ctr"/>
+            <a:endParaRPr lang="en-US" sz="2400"/>
+          </a:p>
+        </p:txBody>
+      </p:sp>
+      <p:sp>
+        <p:nvSpPr>
+          <p:cNvPr id="6" name="Rounded Rectangle 5">
+            <a:extLst>
+              <a:ext uri="{FF2B5EF4-FFF2-40B4-BE49-F238E27FC236}">
+                <a16:creationId xmlns:a16="http://schemas.microsoft.com/office/drawing/2014/main" id="{90CB2AE9-FA5C-2248-A481-590F385790EF}"/>
+              </a:ext>
+            </a:extLst>
+          </p:cNvPr>
+          <p:cNvSpPr/>
+          <p:nvPr/>
+        </p:nvSpPr>
+        <p:spPr>
+          <a:xfrm>
+            <a:off x="2697809" y="4483155"/>
+            <a:ext cx="1462378" cy="409355"/>
+          </a:xfrm>
+          <a:prstGeom prst="roundRect">
+            <a:avLst>
+              <a:gd name="adj" fmla="val 50000"/>
+            </a:avLst>
+          </a:prstGeom>
+          <a:solidFill>
+            <a:srgbClr val="1F222A"/>
+          </a:solidFill>
+          <a:ln>
+            <a:noFill/>
+          </a:ln>
+        </p:spPr>
+        <p:style>
+          <a:lnRef idx="2">
+            <a:schemeClr val="accent1">
+              <a:shade val="50000"/>
+            </a:schemeClr>
+          </a:lnRef>
+          <a:fillRef idx="1">
+            <a:schemeClr val="accent1"/>
+          </a:fillRef>
+          <a:effectRef idx="0">
+            <a:schemeClr val="accent1"/>
+          </a:effectRef>
+          <a:fontRef idx="minor">
+            <a:schemeClr val="lt1"/>
+          </a:fontRef>
+        </p:style>
+        <p:txBody>
+          <a:bodyPr rtlCol="0" anchor="ctr"/>
+          <a:lstStyle/>
+          <a:p>
+            <a:pPr algn="ctr"/>
+            <a:r>
+              <a:rPr lang="en-US" sz="1600" dirty="0">
+                <a:latin typeface="Reliable DEMO" panose="02000506000000020004" pitchFamily="2" charset="0"/>
+              </a:rPr>
+              <a:t>Say</a:t>
+            </a:r>
+            <a:r>
+              <a:rPr lang="en-US" sz="1200" dirty="0">
+                <a:latin typeface="Reliable DEMO" panose="02000506000000020004" pitchFamily="2" charset="0"/>
+              </a:rPr>
+              <a:t> </a:t>
+            </a:r>
+            <a:r>
+              <a:rPr lang="en-US" sz="1600" dirty="0">
+                <a:latin typeface="Reliable DEMO" panose="02000506000000020004" pitchFamily="2" charset="0"/>
+              </a:rPr>
+              <a:t>Hello</a:t>
+            </a:r>
+            <a:endParaRPr lang="en-US" sz="1200" dirty="0">
+              <a:latin typeface="Reliable DEMO" panose="02000506000000020004" pitchFamily="2" charset="0"/>
+            </a:endParaRPr>
           </a:p>
         </p:txBody>
       </p:sp>
@@ -5299,6 +5395,1628 @@
           </a:prstGeom>
         </p:spPr>
       </p:pic>
+      <p:grpSp>
+        <p:nvGrpSpPr>
+          <p:cNvPr id="26" name="Group 25">
+            <a:extLst>
+              <a:ext uri="{FF2B5EF4-FFF2-40B4-BE49-F238E27FC236}">
+                <a16:creationId xmlns:a16="http://schemas.microsoft.com/office/drawing/2014/main" id="{FB4CC19C-CF7A-7540-9F58-6BAB09F43918}"/>
+              </a:ext>
+            </a:extLst>
+          </p:cNvPr>
+          <p:cNvGrpSpPr/>
+          <p:nvPr/>
+        </p:nvGrpSpPr>
+        <p:grpSpPr>
+          <a:xfrm>
+            <a:off x="3916324" y="781176"/>
+            <a:ext cx="2053601" cy="2053601"/>
+            <a:chOff x="4643438" y="1285876"/>
+            <a:chExt cx="3586162" cy="3586162"/>
+          </a:xfrm>
+        </p:grpSpPr>
+        <p:sp>
+          <p:nvSpPr>
+            <p:cNvPr id="27" name="Oval 26">
+              <a:extLst>
+                <a:ext uri="{FF2B5EF4-FFF2-40B4-BE49-F238E27FC236}">
+                  <a16:creationId xmlns:a16="http://schemas.microsoft.com/office/drawing/2014/main" id="{45604EA8-4FCD-A240-B549-10DAB4474362}"/>
+                </a:ext>
+              </a:extLst>
+            </p:cNvPr>
+            <p:cNvSpPr/>
+            <p:nvPr/>
+          </p:nvSpPr>
+          <p:spPr>
+            <a:xfrm>
+              <a:off x="4643438" y="1285876"/>
+              <a:ext cx="3586162" cy="3586162"/>
+            </a:xfrm>
+            <a:prstGeom prst="ellipse">
+              <a:avLst/>
+            </a:prstGeom>
+            <a:solidFill>
+              <a:srgbClr val="A5BCC3"/>
+            </a:solidFill>
+            <a:ln>
+              <a:noFill/>
+            </a:ln>
+          </p:spPr>
+          <p:style>
+            <a:lnRef idx="2">
+              <a:schemeClr val="accent1">
+                <a:shade val="50000"/>
+              </a:schemeClr>
+            </a:lnRef>
+            <a:fillRef idx="1">
+              <a:schemeClr val="accent1"/>
+            </a:fillRef>
+            <a:effectRef idx="0">
+              <a:schemeClr val="accent1"/>
+            </a:effectRef>
+            <a:fontRef idx="minor">
+              <a:schemeClr val="lt1"/>
+            </a:fontRef>
+          </p:style>
+          <p:txBody>
+            <a:bodyPr rtlCol="0" anchor="ctr"/>
+            <a:lstStyle/>
+            <a:p>
+              <a:pPr algn="ctr"/>
+              <a:endParaRPr lang="en-US" dirty="0"/>
+            </a:p>
+          </p:txBody>
+        </p:sp>
+        <p:pic>
+          <p:nvPicPr>
+            <p:cNvPr id="28" name="Picture 27" descr="A person wearing a suit and tie smiling at the camera&#10;&#10;Description automatically generated">
+              <a:extLst>
+                <a:ext uri="{FF2B5EF4-FFF2-40B4-BE49-F238E27FC236}">
+                  <a16:creationId xmlns:a16="http://schemas.microsoft.com/office/drawing/2014/main" id="{93579B5D-6BA8-1242-83A7-9ECD020FD86E}"/>
+                </a:ext>
+              </a:extLst>
+            </p:cNvPr>
+            <p:cNvPicPr>
+              <a:picLocks noChangeAspect="1"/>
+            </p:cNvPicPr>
+            <p:nvPr/>
+          </p:nvPicPr>
+          <p:blipFill rotWithShape="1">
+            <a:blip r:embed="rId3"/>
+            <a:srcRect l="65988" t="3744" r="4304" b="43751"/>
+            <a:stretch/>
+          </p:blipFill>
+          <p:spPr>
+            <a:xfrm>
+              <a:off x="4746229" y="1388667"/>
+              <a:ext cx="3380580" cy="3380580"/>
+            </a:xfrm>
+            <a:prstGeom prst="ellipse">
+              <a:avLst/>
+            </a:prstGeom>
+          </p:spPr>
+        </p:pic>
+      </p:grpSp>
+      <p:sp>
+        <p:nvSpPr>
+          <p:cNvPr id="30" name="TextBox 29">
+            <a:extLst>
+              <a:ext uri="{FF2B5EF4-FFF2-40B4-BE49-F238E27FC236}">
+                <a16:creationId xmlns:a16="http://schemas.microsoft.com/office/drawing/2014/main" id="{948E0EB1-BB44-584B-A66C-8B6B4FB3A376}"/>
+              </a:ext>
+            </a:extLst>
+          </p:cNvPr>
+          <p:cNvSpPr txBox="1"/>
+          <p:nvPr/>
+        </p:nvSpPr>
+        <p:spPr>
+          <a:xfrm>
+            <a:off x="946938" y="669370"/>
+            <a:ext cx="2661306" cy="769441"/>
+          </a:xfrm>
+          <a:prstGeom prst="rect">
+            <a:avLst/>
+          </a:prstGeom>
+          <a:noFill/>
+        </p:spPr>
+        <p:txBody>
+          <a:bodyPr wrap="none" rtlCol="0">
+            <a:spAutoFit/>
+          </a:bodyPr>
+          <a:lstStyle/>
+          <a:p>
+            <a:r>
+              <a:rPr lang="en-US" sz="4400" dirty="0">
+                <a:solidFill>
+                  <a:srgbClr val="D9E0E2"/>
+                </a:solidFill>
+                <a:latin typeface="Reliable DEMO" panose="02000506000000020004" pitchFamily="2" charset="0"/>
+              </a:rPr>
+              <a:t>Sam hulme</a:t>
+            </a:r>
+          </a:p>
+        </p:txBody>
+      </p:sp>
+      <p:sp>
+        <p:nvSpPr>
+          <p:cNvPr id="2" name="TextBox 1">
+            <a:extLst>
+              <a:ext uri="{FF2B5EF4-FFF2-40B4-BE49-F238E27FC236}">
+                <a16:creationId xmlns:a16="http://schemas.microsoft.com/office/drawing/2014/main" id="{724BA2CD-8125-904C-AD0C-D679A96286AA}"/>
+              </a:ext>
+            </a:extLst>
+          </p:cNvPr>
+          <p:cNvSpPr txBox="1"/>
+          <p:nvPr/>
+        </p:nvSpPr>
+        <p:spPr>
+          <a:xfrm>
+            <a:off x="1272077" y="6598182"/>
+            <a:ext cx="910827" cy="369332"/>
+          </a:xfrm>
+          <a:prstGeom prst="rect">
+            <a:avLst/>
+          </a:prstGeom>
+          <a:solidFill>
+            <a:srgbClr val="8F9294"/>
+          </a:solidFill>
+          <a:ln>
+            <a:noFill/>
+          </a:ln>
+        </p:spPr>
+        <p:txBody>
+          <a:bodyPr wrap="none" rtlCol="0">
+            <a:spAutoFit/>
+          </a:bodyPr>
+          <a:lstStyle/>
+          <a:p>
+            <a:r>
+              <a:rPr lang="en-US" b="1" dirty="0">
+                <a:solidFill>
+                  <a:srgbClr val="D9E0E2"/>
+                </a:solidFill>
+                <a:latin typeface="Reliable DEMO" panose="02000506000000020004" pitchFamily="2" charset="0"/>
+                <a:ea typeface="Karla" pitchFamily="2" charset="0"/>
+              </a:rPr>
+              <a:t>Resume</a:t>
+            </a:r>
+          </a:p>
+        </p:txBody>
+      </p:sp>
+      <p:sp>
+        <p:nvSpPr>
+          <p:cNvPr id="3" name="TextBox 2">
+            <a:extLst>
+              <a:ext uri="{FF2B5EF4-FFF2-40B4-BE49-F238E27FC236}">
+                <a16:creationId xmlns:a16="http://schemas.microsoft.com/office/drawing/2014/main" id="{A6AC305F-D1FB-2B41-A173-2D009CC3A283}"/>
+              </a:ext>
+            </a:extLst>
+          </p:cNvPr>
+          <p:cNvSpPr txBox="1"/>
+          <p:nvPr/>
+        </p:nvSpPr>
+        <p:spPr>
+          <a:xfrm>
+            <a:off x="2881378" y="6597485"/>
+            <a:ext cx="1064715" cy="369332"/>
+          </a:xfrm>
+          <a:prstGeom prst="rect">
+            <a:avLst/>
+          </a:prstGeom>
+          <a:solidFill>
+            <a:srgbClr val="8F9294"/>
+          </a:solidFill>
+          <a:ln>
+            <a:noFill/>
+          </a:ln>
+        </p:spPr>
+        <p:txBody>
+          <a:bodyPr wrap="none" rtlCol="0">
+            <a:spAutoFit/>
+          </a:bodyPr>
+          <a:lstStyle/>
+          <a:p>
+            <a:r>
+              <a:rPr lang="en-US" b="1" dirty="0">
+                <a:solidFill>
+                  <a:srgbClr val="D9E0E2"/>
+                </a:solidFill>
+                <a:latin typeface="Reliable DEMO" panose="02000506000000020004" pitchFamily="2" charset="0"/>
+                <a:ea typeface="Karla" pitchFamily="2" charset="0"/>
+              </a:rPr>
+              <a:t>Projects</a:t>
+            </a:r>
+          </a:p>
+        </p:txBody>
+      </p:sp>
+      <p:sp>
+        <p:nvSpPr>
+          <p:cNvPr id="5" name="TextBox 4">
+            <a:extLst>
+              <a:ext uri="{FF2B5EF4-FFF2-40B4-BE49-F238E27FC236}">
+                <a16:creationId xmlns:a16="http://schemas.microsoft.com/office/drawing/2014/main" id="{D8D1F578-97D9-1242-9BA1-C34C3EA30BDE}"/>
+              </a:ext>
+            </a:extLst>
+          </p:cNvPr>
+          <p:cNvSpPr txBox="1"/>
+          <p:nvPr/>
+        </p:nvSpPr>
+        <p:spPr>
+          <a:xfrm>
+            <a:off x="4680458" y="6597485"/>
+            <a:ext cx="801823" cy="369332"/>
+          </a:xfrm>
+          <a:prstGeom prst="rect">
+            <a:avLst/>
+          </a:prstGeom>
+          <a:solidFill>
+            <a:srgbClr val="8F9294"/>
+          </a:solidFill>
+          <a:ln>
+            <a:noFill/>
+          </a:ln>
+        </p:spPr>
+        <p:txBody>
+          <a:bodyPr wrap="none" rtlCol="0">
+            <a:spAutoFit/>
+          </a:bodyPr>
+          <a:lstStyle/>
+          <a:p>
+            <a:r>
+              <a:rPr lang="en-US" b="1" dirty="0">
+                <a:solidFill>
+                  <a:srgbClr val="D9E0E2"/>
+                </a:solidFill>
+                <a:latin typeface="Reliable DEMO" panose="02000506000000020004" pitchFamily="2" charset="0"/>
+                <a:ea typeface="Karla" pitchFamily="2" charset="0"/>
+              </a:rPr>
+              <a:t>Social</a:t>
+            </a:r>
+          </a:p>
+        </p:txBody>
+      </p:sp>
+      <p:sp>
+        <p:nvSpPr>
+          <p:cNvPr id="12" name="Rounded Rectangle 11">
+            <a:extLst>
+              <a:ext uri="{FF2B5EF4-FFF2-40B4-BE49-F238E27FC236}">
+                <a16:creationId xmlns:a16="http://schemas.microsoft.com/office/drawing/2014/main" id="{CD59C494-F06D-C348-84B7-B01F6E3B93C0}"/>
+              </a:ext>
+            </a:extLst>
+          </p:cNvPr>
+          <p:cNvSpPr/>
+          <p:nvPr/>
+        </p:nvSpPr>
+        <p:spPr>
+          <a:xfrm>
+            <a:off x="1795751" y="4134761"/>
+            <a:ext cx="3266502" cy="236490"/>
+          </a:xfrm>
+          <a:prstGeom prst="roundRect">
+            <a:avLst>
+              <a:gd name="adj" fmla="val 5128"/>
+            </a:avLst>
+          </a:prstGeom>
+          <a:solidFill>
+            <a:srgbClr val="F4F3F3"/>
+          </a:solidFill>
+          <a:ln>
+            <a:solidFill>
+              <a:srgbClr val="8F9294"/>
+            </a:solidFill>
+          </a:ln>
+        </p:spPr>
+        <p:style>
+          <a:lnRef idx="2">
+            <a:schemeClr val="accent1">
+              <a:shade val="50000"/>
+            </a:schemeClr>
+          </a:lnRef>
+          <a:fillRef idx="1">
+            <a:schemeClr val="accent1"/>
+          </a:fillRef>
+          <a:effectRef idx="0">
+            <a:schemeClr val="accent1"/>
+          </a:effectRef>
+          <a:fontRef idx="minor">
+            <a:schemeClr val="lt1"/>
+          </a:fontRef>
+        </p:style>
+        <p:txBody>
+          <a:bodyPr rtlCol="0" anchor="ctr"/>
+          <a:lstStyle/>
+          <a:p>
+            <a:r>
+              <a:rPr lang="en-US" sz="900" dirty="0">
+                <a:solidFill>
+                  <a:srgbClr val="8F9294"/>
+                </a:solidFill>
+                <a:latin typeface="Karla" pitchFamily="2" charset="0"/>
+                <a:ea typeface="Karla" pitchFamily="2" charset="0"/>
+              </a:rPr>
+              <a:t>Enter name or message here…</a:t>
+            </a:r>
+          </a:p>
+        </p:txBody>
+      </p:sp>
+      <p:grpSp>
+        <p:nvGrpSpPr>
+          <p:cNvPr id="36" name="Group 35">
+            <a:extLst>
+              <a:ext uri="{FF2B5EF4-FFF2-40B4-BE49-F238E27FC236}">
+                <a16:creationId xmlns:a16="http://schemas.microsoft.com/office/drawing/2014/main" id="{8D78E7AD-C95B-E842-9ABB-E0D34744D316}"/>
+              </a:ext>
+            </a:extLst>
+          </p:cNvPr>
+          <p:cNvGrpSpPr/>
+          <p:nvPr/>
+        </p:nvGrpSpPr>
+        <p:grpSpPr>
+          <a:xfrm>
+            <a:off x="4893135" y="4203017"/>
+            <a:ext cx="99978" cy="99978"/>
+            <a:chOff x="2179122" y="3800104"/>
+            <a:chExt cx="1335974" cy="1335974"/>
+          </a:xfrm>
+        </p:grpSpPr>
+        <p:sp>
+          <p:nvSpPr>
+            <p:cNvPr id="37" name="Oval 36">
+              <a:extLst>
+                <a:ext uri="{FF2B5EF4-FFF2-40B4-BE49-F238E27FC236}">
+                  <a16:creationId xmlns:a16="http://schemas.microsoft.com/office/drawing/2014/main" id="{4A1E868A-2EF0-DD4B-878B-98C9C85AD31F}"/>
+                </a:ext>
+              </a:extLst>
+            </p:cNvPr>
+            <p:cNvSpPr/>
+            <p:nvPr/>
+          </p:nvSpPr>
+          <p:spPr>
+            <a:xfrm>
+              <a:off x="2179122" y="3800104"/>
+              <a:ext cx="1335974" cy="1335974"/>
+            </a:xfrm>
+            <a:prstGeom prst="ellipse">
+              <a:avLst/>
+            </a:prstGeom>
+            <a:solidFill>
+              <a:srgbClr val="8F9294"/>
+            </a:solidFill>
+            <a:ln>
+              <a:noFill/>
+            </a:ln>
+          </p:spPr>
+          <p:style>
+            <a:lnRef idx="2">
+              <a:schemeClr val="accent1">
+                <a:shade val="50000"/>
+              </a:schemeClr>
+            </a:lnRef>
+            <a:fillRef idx="1">
+              <a:schemeClr val="accent1"/>
+            </a:fillRef>
+            <a:effectRef idx="0">
+              <a:schemeClr val="accent1"/>
+            </a:effectRef>
+            <a:fontRef idx="minor">
+              <a:schemeClr val="lt1"/>
+            </a:fontRef>
+          </p:style>
+          <p:txBody>
+            <a:bodyPr rtlCol="0" anchor="ctr"/>
+            <a:lstStyle/>
+            <a:p>
+              <a:pPr algn="ctr"/>
+              <a:endParaRPr lang="en-US" dirty="0"/>
+            </a:p>
+          </p:txBody>
+        </p:sp>
+        <p:sp>
+          <p:nvSpPr>
+            <p:cNvPr id="38" name="Cross 37">
+              <a:extLst>
+                <a:ext uri="{FF2B5EF4-FFF2-40B4-BE49-F238E27FC236}">
+                  <a16:creationId xmlns:a16="http://schemas.microsoft.com/office/drawing/2014/main" id="{D5D33B88-0773-CD45-9FD0-7C9613043E01}"/>
+                </a:ext>
+              </a:extLst>
+            </p:cNvPr>
+            <p:cNvSpPr/>
+            <p:nvPr/>
+          </p:nvSpPr>
+          <p:spPr>
+            <a:xfrm rot="18900000">
+              <a:off x="2368314" y="4013782"/>
+              <a:ext cx="950025" cy="950025"/>
+            </a:xfrm>
+            <a:prstGeom prst="plus">
+              <a:avLst>
+                <a:gd name="adj" fmla="val 41875"/>
+              </a:avLst>
+            </a:prstGeom>
+            <a:solidFill>
+              <a:srgbClr val="D9E0E2"/>
+            </a:solidFill>
+            <a:ln>
+              <a:noFill/>
+            </a:ln>
+          </p:spPr>
+          <p:style>
+            <a:lnRef idx="2">
+              <a:schemeClr val="accent1">
+                <a:shade val="50000"/>
+              </a:schemeClr>
+            </a:lnRef>
+            <a:fillRef idx="1">
+              <a:schemeClr val="accent1"/>
+            </a:fillRef>
+            <a:effectRef idx="0">
+              <a:schemeClr val="accent1"/>
+            </a:effectRef>
+            <a:fontRef idx="minor">
+              <a:schemeClr val="lt1"/>
+            </a:fontRef>
+          </p:style>
+          <p:txBody>
+            <a:bodyPr rtlCol="0" anchor="ctr"/>
+            <a:lstStyle/>
+            <a:p>
+              <a:pPr algn="ctr"/>
+              <a:endParaRPr lang="en-US"/>
+            </a:p>
+          </p:txBody>
+        </p:sp>
+      </p:grpSp>
+      <p:sp>
+        <p:nvSpPr>
+          <p:cNvPr id="22" name="TextBox 21">
+            <a:extLst>
+              <a:ext uri="{FF2B5EF4-FFF2-40B4-BE49-F238E27FC236}">
+                <a16:creationId xmlns:a16="http://schemas.microsoft.com/office/drawing/2014/main" id="{D7EC49B2-3D4B-A64B-BDF0-5DF9333D397A}"/>
+              </a:ext>
+            </a:extLst>
+          </p:cNvPr>
+          <p:cNvSpPr txBox="1"/>
+          <p:nvPr/>
+        </p:nvSpPr>
+        <p:spPr>
+          <a:xfrm>
+            <a:off x="888079" y="3395537"/>
+            <a:ext cx="5234354" cy="600164"/>
+          </a:xfrm>
+          <a:prstGeom prst="rect">
+            <a:avLst/>
+          </a:prstGeom>
+          <a:noFill/>
+        </p:spPr>
+        <p:txBody>
+          <a:bodyPr wrap="square" rtlCol="0">
+            <a:spAutoFit/>
+          </a:bodyPr>
+          <a:lstStyle/>
+          <a:p>
+            <a:pPr algn="ctr"/>
+            <a:r>
+              <a:rPr lang="en-US" sz="1100" dirty="0">
+                <a:solidFill>
+                  <a:srgbClr val="8F9294"/>
+                </a:solidFill>
+                <a:latin typeface="Karla" pitchFamily="2" charset="0"/>
+                <a:ea typeface="Karla" pitchFamily="2" charset="0"/>
+              </a:rPr>
+              <a:t>First time here? Say hi by entering a message below. I’m always curious to know who visits my site! After that, feel free to poke around and see what interesting things you can find. There is always new stuff being added!</a:t>
+            </a:r>
+          </a:p>
+        </p:txBody>
+      </p:sp>
+      <p:sp>
+        <p:nvSpPr>
+          <p:cNvPr id="39" name="TextBox 38">
+            <a:extLst>
+              <a:ext uri="{FF2B5EF4-FFF2-40B4-BE49-F238E27FC236}">
+                <a16:creationId xmlns:a16="http://schemas.microsoft.com/office/drawing/2014/main" id="{A055A6A5-E301-6943-A249-094CC029B4D7}"/>
+              </a:ext>
+            </a:extLst>
+          </p:cNvPr>
+          <p:cNvSpPr txBox="1"/>
+          <p:nvPr/>
+        </p:nvSpPr>
+        <p:spPr>
+          <a:xfrm>
+            <a:off x="5826300" y="46284"/>
+            <a:ext cx="635110" cy="261610"/>
+          </a:xfrm>
+          <a:prstGeom prst="rect">
+            <a:avLst/>
+          </a:prstGeom>
+          <a:noFill/>
+        </p:spPr>
+        <p:txBody>
+          <a:bodyPr wrap="none" rtlCol="0">
+            <a:spAutoFit/>
+          </a:bodyPr>
+          <a:lstStyle/>
+          <a:p>
+            <a:r>
+              <a:rPr lang="en-US" sz="1100" dirty="0">
+                <a:solidFill>
+                  <a:srgbClr val="D9E0E2"/>
+                </a:solidFill>
+                <a:latin typeface="Karla" pitchFamily="2" charset="0"/>
+                <a:ea typeface="Karla" pitchFamily="2" charset="0"/>
+              </a:rPr>
+              <a:t>Sign In</a:t>
+            </a:r>
+          </a:p>
+        </p:txBody>
+      </p:sp>
+      <p:sp>
+        <p:nvSpPr>
+          <p:cNvPr id="8" name="TextBox 7">
+            <a:extLst>
+              <a:ext uri="{FF2B5EF4-FFF2-40B4-BE49-F238E27FC236}">
+                <a16:creationId xmlns:a16="http://schemas.microsoft.com/office/drawing/2014/main" id="{949F75DA-C63A-B245-AECB-8550A682B431}"/>
+              </a:ext>
+            </a:extLst>
+          </p:cNvPr>
+          <p:cNvSpPr txBox="1"/>
+          <p:nvPr/>
+        </p:nvSpPr>
+        <p:spPr>
+          <a:xfrm>
+            <a:off x="5309676" y="8787198"/>
+            <a:ext cx="1556836" cy="369332"/>
+          </a:xfrm>
+          <a:prstGeom prst="rect">
+            <a:avLst/>
+          </a:prstGeom>
+          <a:noFill/>
+        </p:spPr>
+        <p:txBody>
+          <a:bodyPr wrap="none" rtlCol="0">
+            <a:spAutoFit/>
+          </a:bodyPr>
+          <a:lstStyle/>
+          <a:p>
+            <a:r>
+              <a:rPr lang="en-US" dirty="0">
+                <a:solidFill>
+                  <a:srgbClr val="D9E0E2"/>
+                </a:solidFill>
+                <a:latin typeface="Reliable DEMO" panose="02000506000000020004" pitchFamily="2" charset="0"/>
+              </a:rPr>
+              <a:t>Samhulme.com</a:t>
+            </a:r>
+          </a:p>
+        </p:txBody>
+      </p:sp>
+      <p:sp>
+        <p:nvSpPr>
+          <p:cNvPr id="40" name="TextBox 39">
+            <a:extLst>
+              <a:ext uri="{FF2B5EF4-FFF2-40B4-BE49-F238E27FC236}">
+                <a16:creationId xmlns:a16="http://schemas.microsoft.com/office/drawing/2014/main" id="{7D0FB8C0-E686-4746-8238-F78632EB7256}"/>
+              </a:ext>
+            </a:extLst>
+          </p:cNvPr>
+          <p:cNvSpPr txBox="1"/>
+          <p:nvPr/>
+        </p:nvSpPr>
+        <p:spPr>
+          <a:xfrm>
+            <a:off x="1563859" y="8476905"/>
+            <a:ext cx="3882794" cy="276999"/>
+          </a:xfrm>
+          <a:prstGeom prst="rect">
+            <a:avLst/>
+          </a:prstGeom>
+          <a:noFill/>
+        </p:spPr>
+        <p:txBody>
+          <a:bodyPr wrap="none" rtlCol="0">
+            <a:spAutoFit/>
+          </a:bodyPr>
+          <a:lstStyle/>
+          <a:p>
+            <a:r>
+              <a:rPr lang="en-US" sz="1200" dirty="0">
+                <a:solidFill>
+                  <a:srgbClr val="D9E0E2"/>
+                </a:solidFill>
+                <a:latin typeface="Karla" pitchFamily="2" charset="0"/>
+                <a:ea typeface="Karla" pitchFamily="2" charset="0"/>
+              </a:rPr>
+              <a:t>Sam Hulme | (406) 750-8136 | shulme33@gmail.com</a:t>
+            </a:r>
+            <a:endParaRPr lang="en-US" sz="1600" dirty="0">
+              <a:solidFill>
+                <a:srgbClr val="D9E0E2"/>
+              </a:solidFill>
+              <a:latin typeface="Karla" pitchFamily="2" charset="0"/>
+              <a:ea typeface="Karla" pitchFamily="2" charset="0"/>
+            </a:endParaRPr>
+          </a:p>
+        </p:txBody>
+      </p:sp>
+      <p:grpSp>
+        <p:nvGrpSpPr>
+          <p:cNvPr id="42" name="Group 41">
+            <a:extLst>
+              <a:ext uri="{FF2B5EF4-FFF2-40B4-BE49-F238E27FC236}">
+                <a16:creationId xmlns:a16="http://schemas.microsoft.com/office/drawing/2014/main" id="{4F41DF87-646E-7646-90F6-35E5A0E16622}"/>
+              </a:ext>
+            </a:extLst>
+          </p:cNvPr>
+          <p:cNvGrpSpPr/>
+          <p:nvPr/>
+        </p:nvGrpSpPr>
+        <p:grpSpPr>
+          <a:xfrm>
+            <a:off x="120941" y="8441940"/>
+            <a:ext cx="593893" cy="593893"/>
+            <a:chOff x="4643438" y="1285876"/>
+            <a:chExt cx="3586162" cy="3586162"/>
+          </a:xfrm>
+        </p:grpSpPr>
+        <p:sp>
+          <p:nvSpPr>
+            <p:cNvPr id="43" name="Oval 42">
+              <a:extLst>
+                <a:ext uri="{FF2B5EF4-FFF2-40B4-BE49-F238E27FC236}">
+                  <a16:creationId xmlns:a16="http://schemas.microsoft.com/office/drawing/2014/main" id="{EF5C7E16-6639-D444-B160-3AF9E01BB600}"/>
+                </a:ext>
+              </a:extLst>
+            </p:cNvPr>
+            <p:cNvSpPr/>
+            <p:nvPr/>
+          </p:nvSpPr>
+          <p:spPr>
+            <a:xfrm>
+              <a:off x="4643438" y="1285876"/>
+              <a:ext cx="3586162" cy="3586162"/>
+            </a:xfrm>
+            <a:prstGeom prst="ellipse">
+              <a:avLst/>
+            </a:prstGeom>
+            <a:solidFill>
+              <a:srgbClr val="A5BCC3"/>
+            </a:solidFill>
+            <a:ln>
+              <a:noFill/>
+            </a:ln>
+          </p:spPr>
+          <p:style>
+            <a:lnRef idx="2">
+              <a:schemeClr val="accent1">
+                <a:shade val="50000"/>
+              </a:schemeClr>
+            </a:lnRef>
+            <a:fillRef idx="1">
+              <a:schemeClr val="accent1"/>
+            </a:fillRef>
+            <a:effectRef idx="0">
+              <a:schemeClr val="accent1"/>
+            </a:effectRef>
+            <a:fontRef idx="minor">
+              <a:schemeClr val="lt1"/>
+            </a:fontRef>
+          </p:style>
+          <p:txBody>
+            <a:bodyPr rtlCol="0" anchor="ctr"/>
+            <a:lstStyle/>
+            <a:p>
+              <a:pPr algn="ctr"/>
+              <a:endParaRPr lang="en-US" dirty="0"/>
+            </a:p>
+          </p:txBody>
+        </p:sp>
+        <p:pic>
+          <p:nvPicPr>
+            <p:cNvPr id="44" name="Picture 43" descr="A person wearing a suit and tie smiling at the camera&#10;&#10;Description automatically generated">
+              <a:extLst>
+                <a:ext uri="{FF2B5EF4-FFF2-40B4-BE49-F238E27FC236}">
+                  <a16:creationId xmlns:a16="http://schemas.microsoft.com/office/drawing/2014/main" id="{C990FA17-68F5-DB4F-B968-4AF8E8C8E002}"/>
+                </a:ext>
+              </a:extLst>
+            </p:cNvPr>
+            <p:cNvPicPr>
+              <a:picLocks noChangeAspect="1"/>
+            </p:cNvPicPr>
+            <p:nvPr/>
+          </p:nvPicPr>
+          <p:blipFill rotWithShape="1">
+            <a:blip r:embed="rId3"/>
+            <a:srcRect l="65988" t="3744" r="4304" b="43751"/>
+            <a:stretch/>
+          </p:blipFill>
+          <p:spPr>
+            <a:xfrm>
+              <a:off x="4746229" y="1388667"/>
+              <a:ext cx="3380580" cy="3380580"/>
+            </a:xfrm>
+            <a:prstGeom prst="ellipse">
+              <a:avLst/>
+            </a:prstGeom>
+          </p:spPr>
+        </p:pic>
+      </p:grpSp>
+      <p:pic>
+        <p:nvPicPr>
+          <p:cNvPr id="46" name="Picture 45" descr="A close up of a logo&#10;&#10;Description automatically generated">
+            <a:extLst>
+              <a:ext uri="{FF2B5EF4-FFF2-40B4-BE49-F238E27FC236}">
+                <a16:creationId xmlns:a16="http://schemas.microsoft.com/office/drawing/2014/main" id="{ED3733DB-3F56-5049-8D7E-4CC90357072C}"/>
+              </a:ext>
+            </a:extLst>
+          </p:cNvPr>
+          <p:cNvPicPr>
+            <a:picLocks noChangeAspect="1"/>
+          </p:cNvPicPr>
+          <p:nvPr/>
+        </p:nvPicPr>
+        <p:blipFill>
+          <a:blip r:embed="rId4"/>
+          <a:stretch>
+            <a:fillRect/>
+          </a:stretch>
+        </p:blipFill>
+        <p:spPr>
+          <a:xfrm>
+            <a:off x="5112948" y="5426135"/>
+            <a:ext cx="399922" cy="399922"/>
+          </a:xfrm>
+          <a:prstGeom prst="rect">
+            <a:avLst/>
+          </a:prstGeom>
+          <a:solidFill>
+            <a:srgbClr val="8F9294"/>
+          </a:solidFill>
+          <a:ln>
+            <a:noFill/>
+          </a:ln>
+        </p:spPr>
+      </p:pic>
+      <p:pic>
+        <p:nvPicPr>
+          <p:cNvPr id="48" name="Picture 47" descr="A close up of a logo&#10;&#10;Description automatically generated">
+            <a:extLst>
+              <a:ext uri="{FF2B5EF4-FFF2-40B4-BE49-F238E27FC236}">
+                <a16:creationId xmlns:a16="http://schemas.microsoft.com/office/drawing/2014/main" id="{F6597931-5A21-C14D-823A-E6DFB0339F97}"/>
+              </a:ext>
+            </a:extLst>
+          </p:cNvPr>
+          <p:cNvPicPr>
+            <a:picLocks noChangeAspect="1"/>
+          </p:cNvPicPr>
+          <p:nvPr/>
+        </p:nvPicPr>
+        <p:blipFill>
+          <a:blip r:embed="rId5"/>
+          <a:stretch>
+            <a:fillRect/>
+          </a:stretch>
+        </p:blipFill>
+        <p:spPr>
+          <a:xfrm>
+            <a:off x="5107122" y="5969189"/>
+            <a:ext cx="399922" cy="399922"/>
+          </a:xfrm>
+          <a:prstGeom prst="rect">
+            <a:avLst/>
+          </a:prstGeom>
+          <a:solidFill>
+            <a:srgbClr val="8F9294"/>
+          </a:solidFill>
+          <a:ln>
+            <a:noFill/>
+          </a:ln>
+        </p:spPr>
+      </p:pic>
+      <p:pic>
+        <p:nvPicPr>
+          <p:cNvPr id="50" name="Picture 49" descr="A close up of a logo&#10;&#10;Description automatically generated">
+            <a:extLst>
+              <a:ext uri="{FF2B5EF4-FFF2-40B4-BE49-F238E27FC236}">
+                <a16:creationId xmlns:a16="http://schemas.microsoft.com/office/drawing/2014/main" id="{2D176E5F-709A-8B44-9AB9-4974FCCE38F6}"/>
+              </a:ext>
+            </a:extLst>
+          </p:cNvPr>
+          <p:cNvPicPr>
+            <a:picLocks noChangeAspect="1"/>
+          </p:cNvPicPr>
+          <p:nvPr/>
+        </p:nvPicPr>
+        <p:blipFill>
+          <a:blip r:embed="rId6"/>
+          <a:stretch>
+            <a:fillRect/>
+          </a:stretch>
+        </p:blipFill>
+        <p:spPr>
+          <a:xfrm>
+            <a:off x="4618700" y="5970810"/>
+            <a:ext cx="399922" cy="399922"/>
+          </a:xfrm>
+          <a:prstGeom prst="rect">
+            <a:avLst/>
+          </a:prstGeom>
+          <a:solidFill>
+            <a:srgbClr val="8F9294"/>
+          </a:solidFill>
+          <a:ln>
+            <a:noFill/>
+          </a:ln>
+        </p:spPr>
+      </p:pic>
+      <p:pic>
+        <p:nvPicPr>
+          <p:cNvPr id="52" name="Picture 51" descr="A close up of a logo&#10;&#10;Description automatically generated">
+            <a:extLst>
+              <a:ext uri="{FF2B5EF4-FFF2-40B4-BE49-F238E27FC236}">
+                <a16:creationId xmlns:a16="http://schemas.microsoft.com/office/drawing/2014/main" id="{D3386B5D-7702-924C-AE24-5D33ACFF5187}"/>
+              </a:ext>
+            </a:extLst>
+          </p:cNvPr>
+          <p:cNvPicPr>
+            <a:picLocks noChangeAspect="1"/>
+          </p:cNvPicPr>
+          <p:nvPr/>
+        </p:nvPicPr>
+        <p:blipFill>
+          <a:blip r:embed="rId7"/>
+          <a:stretch>
+            <a:fillRect/>
+          </a:stretch>
+        </p:blipFill>
+        <p:spPr>
+          <a:xfrm>
+            <a:off x="4624526" y="5432267"/>
+            <a:ext cx="399922" cy="399922"/>
+          </a:xfrm>
+          <a:prstGeom prst="rect">
+            <a:avLst/>
+          </a:prstGeom>
+          <a:solidFill>
+            <a:srgbClr val="8F9294"/>
+          </a:solidFill>
+          <a:ln>
+            <a:noFill/>
+          </a:ln>
+        </p:spPr>
+      </p:pic>
+      <p:pic>
+        <p:nvPicPr>
+          <p:cNvPr id="56" name="Picture 55" descr="A picture containing drawing, plate&#10;&#10;Description automatically generated">
+            <a:extLst>
+              <a:ext uri="{FF2B5EF4-FFF2-40B4-BE49-F238E27FC236}">
+                <a16:creationId xmlns:a16="http://schemas.microsoft.com/office/drawing/2014/main" id="{5458AB84-164F-7A43-9A83-F2F46F97A822}"/>
+              </a:ext>
+            </a:extLst>
+          </p:cNvPr>
+          <p:cNvPicPr>
+            <a:picLocks noChangeAspect="1"/>
+          </p:cNvPicPr>
+          <p:nvPr/>
+        </p:nvPicPr>
+        <p:blipFill>
+          <a:blip r:embed="rId8"/>
+          <a:stretch>
+            <a:fillRect/>
+          </a:stretch>
+        </p:blipFill>
+        <p:spPr>
+          <a:xfrm>
+            <a:off x="2915005" y="5387016"/>
+            <a:ext cx="1051891" cy="1051891"/>
+          </a:xfrm>
+          <a:prstGeom prst="rect">
+            <a:avLst/>
+          </a:prstGeom>
+          <a:solidFill>
+            <a:srgbClr val="8F9294"/>
+          </a:solidFill>
+          <a:ln>
+            <a:noFill/>
+          </a:ln>
+        </p:spPr>
+      </p:pic>
+      <p:pic>
+        <p:nvPicPr>
+          <p:cNvPr id="58" name="Picture 57" descr="A picture containing drawing, plate&#10;&#10;Description automatically generated">
+            <a:extLst>
+              <a:ext uri="{FF2B5EF4-FFF2-40B4-BE49-F238E27FC236}">
+                <a16:creationId xmlns:a16="http://schemas.microsoft.com/office/drawing/2014/main" id="{3297FAE2-922F-CB44-8602-DA0F0EEF7A9D}"/>
+              </a:ext>
+            </a:extLst>
+          </p:cNvPr>
+          <p:cNvPicPr>
+            <a:picLocks noChangeAspect="1"/>
+          </p:cNvPicPr>
+          <p:nvPr/>
+        </p:nvPicPr>
+        <p:blipFill>
+          <a:blip r:embed="rId9"/>
+          <a:stretch>
+            <a:fillRect/>
+          </a:stretch>
+        </p:blipFill>
+        <p:spPr>
+          <a:xfrm>
+            <a:off x="1322678" y="5373697"/>
+            <a:ext cx="1051890" cy="1051890"/>
+          </a:xfrm>
+          <a:prstGeom prst="rect">
+            <a:avLst/>
+          </a:prstGeom>
+          <a:solidFill>
+            <a:srgbClr val="8F9294"/>
+          </a:solidFill>
+          <a:ln>
+            <a:noFill/>
+          </a:ln>
+        </p:spPr>
+      </p:pic>
+    </p:spTree>
+    <p:extLst>
+      <p:ext uri="{BB962C8B-B14F-4D97-AF65-F5344CB8AC3E}">
+        <p14:creationId xmlns:p14="http://schemas.microsoft.com/office/powerpoint/2010/main" val="3633668021"/>
+      </p:ext>
+    </p:extLst>
+  </p:cSld>
+  <p:clrMapOvr>
+    <a:masterClrMapping/>
+  </p:clrMapOvr>
+</p:sld>
+</file>
+
+<file path=ppt/slides/slide3.xml><?xml version="1.0" encoding="utf-8"?>
+<p:sld xmlns:a="http://schemas.openxmlformats.org/drawingml/2006/main" xmlns:r="http://schemas.openxmlformats.org/officeDocument/2006/relationships" xmlns:p="http://schemas.openxmlformats.org/presentationml/2006/main">
+  <p:cSld>
+    <p:bg>
+      <p:bgPr>
+        <a:solidFill>
+          <a:srgbClr val="F4F3F3"/>
+        </a:solidFill>
+        <a:effectLst/>
+      </p:bgPr>
+    </p:bg>
+    <p:spTree>
+      <p:nvGrpSpPr>
+        <p:cNvPr id="1" name=""/>
+        <p:cNvGrpSpPr/>
+        <p:nvPr/>
+      </p:nvGrpSpPr>
+      <p:grpSpPr>
+        <a:xfrm>
+          <a:off x="0" y="0"/>
+          <a:ext cx="0" cy="0"/>
+          <a:chOff x="0" y="0"/>
+          <a:chExt cx="0" cy="0"/>
+        </a:xfrm>
+      </p:grpSpPr>
+      <p:sp>
+        <p:nvSpPr>
+          <p:cNvPr id="4" name="Rectangle 3">
+            <a:extLst>
+              <a:ext uri="{FF2B5EF4-FFF2-40B4-BE49-F238E27FC236}">
+                <a16:creationId xmlns:a16="http://schemas.microsoft.com/office/drawing/2014/main" id="{27F93F16-1B53-DD4E-9375-A52485D54031}"/>
+              </a:ext>
+            </a:extLst>
+          </p:cNvPr>
+          <p:cNvSpPr/>
+          <p:nvPr/>
+        </p:nvSpPr>
+        <p:spPr>
+          <a:xfrm>
+            <a:off x="0" y="0"/>
+            <a:ext cx="6858000" cy="361594"/>
+          </a:xfrm>
+          <a:prstGeom prst="rect">
+            <a:avLst/>
+          </a:prstGeom>
+          <a:solidFill>
+            <a:srgbClr val="1F222A"/>
+          </a:solidFill>
+          <a:ln>
+            <a:noFill/>
+          </a:ln>
+        </p:spPr>
+        <p:style>
+          <a:lnRef idx="2">
+            <a:schemeClr val="accent1">
+              <a:shade val="50000"/>
+            </a:schemeClr>
+          </a:lnRef>
+          <a:fillRef idx="1">
+            <a:schemeClr val="accent1"/>
+          </a:fillRef>
+          <a:effectRef idx="0">
+            <a:schemeClr val="accent1"/>
+          </a:effectRef>
+          <a:fontRef idx="minor">
+            <a:schemeClr val="lt1"/>
+          </a:fontRef>
+        </p:style>
+        <p:txBody>
+          <a:bodyPr rtlCol="0" anchor="ctr"/>
+          <a:lstStyle/>
+          <a:p>
+            <a:pPr algn="ctr"/>
+            <a:endParaRPr lang="en-US" sz="2400"/>
+          </a:p>
+        </p:txBody>
+      </p:sp>
+      <p:sp>
+        <p:nvSpPr>
+          <p:cNvPr id="6" name="Rounded Rectangle 5">
+            <a:extLst>
+              <a:ext uri="{FF2B5EF4-FFF2-40B4-BE49-F238E27FC236}">
+                <a16:creationId xmlns:a16="http://schemas.microsoft.com/office/drawing/2014/main" id="{90CB2AE9-FA5C-2248-A481-590F385790EF}"/>
+              </a:ext>
+            </a:extLst>
+          </p:cNvPr>
+          <p:cNvSpPr/>
+          <p:nvPr/>
+        </p:nvSpPr>
+        <p:spPr>
+          <a:xfrm>
+            <a:off x="2697809" y="4483155"/>
+            <a:ext cx="1462378" cy="409355"/>
+          </a:xfrm>
+          <a:prstGeom prst="roundRect">
+            <a:avLst>
+              <a:gd name="adj" fmla="val 50000"/>
+            </a:avLst>
+          </a:prstGeom>
+          <a:solidFill>
+            <a:srgbClr val="1F222A"/>
+          </a:solidFill>
+          <a:ln>
+            <a:noFill/>
+          </a:ln>
+        </p:spPr>
+        <p:style>
+          <a:lnRef idx="2">
+            <a:schemeClr val="accent1">
+              <a:shade val="50000"/>
+            </a:schemeClr>
+          </a:lnRef>
+          <a:fillRef idx="1">
+            <a:schemeClr val="accent1"/>
+          </a:fillRef>
+          <a:effectRef idx="0">
+            <a:schemeClr val="accent1"/>
+          </a:effectRef>
+          <a:fontRef idx="minor">
+            <a:schemeClr val="lt1"/>
+          </a:fontRef>
+        </p:style>
+        <p:txBody>
+          <a:bodyPr rtlCol="0" anchor="ctr"/>
+          <a:lstStyle/>
+          <a:p>
+            <a:pPr algn="ctr"/>
+            <a:r>
+              <a:rPr lang="en-US" sz="1600" dirty="0">
+                <a:latin typeface="AweSomE JouRneY" panose="02000600000000000000" pitchFamily="2" charset="0"/>
+              </a:rPr>
+              <a:t>Say</a:t>
+            </a:r>
+            <a:r>
+              <a:rPr lang="en-US" sz="1200" dirty="0">
+                <a:latin typeface="AweSomE JouRneY" panose="02000600000000000000" pitchFamily="2" charset="0"/>
+              </a:rPr>
+              <a:t> </a:t>
+            </a:r>
+            <a:r>
+              <a:rPr lang="en-US" sz="1600" dirty="0">
+                <a:latin typeface="AweSomE JouRneY" panose="02000600000000000000" pitchFamily="2" charset="0"/>
+              </a:rPr>
+              <a:t>Hello</a:t>
+            </a:r>
+            <a:endParaRPr lang="en-US" sz="1200" dirty="0">
+              <a:latin typeface="AweSomE JouRneY" panose="02000600000000000000" pitchFamily="2" charset="0"/>
+            </a:endParaRPr>
+          </a:p>
+        </p:txBody>
+      </p:sp>
+      <p:sp>
+        <p:nvSpPr>
+          <p:cNvPr id="9" name="Rectangle 8">
+            <a:extLst>
+              <a:ext uri="{FF2B5EF4-FFF2-40B4-BE49-F238E27FC236}">
+                <a16:creationId xmlns:a16="http://schemas.microsoft.com/office/drawing/2014/main" id="{5DF16F49-D792-D64B-B02C-BA63E4CDD8E7}"/>
+              </a:ext>
+            </a:extLst>
+          </p:cNvPr>
+          <p:cNvSpPr/>
+          <p:nvPr/>
+        </p:nvSpPr>
+        <p:spPr>
+          <a:xfrm>
+            <a:off x="888079" y="5093685"/>
+            <a:ext cx="1638344" cy="1950126"/>
+          </a:xfrm>
+          <a:prstGeom prst="rect">
+            <a:avLst/>
+          </a:prstGeom>
+          <a:solidFill>
+            <a:srgbClr val="8F9294"/>
+          </a:solidFill>
+          <a:ln>
+            <a:solidFill>
+              <a:srgbClr val="8F9294"/>
+            </a:solidFill>
+          </a:ln>
+        </p:spPr>
+        <p:style>
+          <a:lnRef idx="2">
+            <a:schemeClr val="accent1">
+              <a:shade val="50000"/>
+            </a:schemeClr>
+          </a:lnRef>
+          <a:fillRef idx="1">
+            <a:schemeClr val="accent1"/>
+          </a:fillRef>
+          <a:effectRef idx="0">
+            <a:schemeClr val="accent1"/>
+          </a:effectRef>
+          <a:fontRef idx="minor">
+            <a:schemeClr val="lt1"/>
+          </a:fontRef>
+        </p:style>
+        <p:txBody>
+          <a:bodyPr rot="0" spcFirstLastPara="0" vertOverflow="overflow" horzOverflow="overflow" vert="horz" wrap="square" lIns="68598" tIns="34299" rIns="68598" bIns="34299" numCol="1" spcCol="0" rtlCol="0" fromWordArt="0" anchor="ctr" anchorCtr="0" forceAA="0" compatLnSpc="1">
+            <a:prstTxWarp prst="textNoShape">
+              <a:avLst/>
+            </a:prstTxWarp>
+            <a:noAutofit/>
+          </a:bodyPr>
+          <a:lstStyle/>
+          <a:p>
+            <a:pPr algn="ctr"/>
+            <a:endParaRPr lang="en-US" sz="1350"/>
+          </a:p>
+        </p:txBody>
+      </p:sp>
+      <p:grpSp>
+        <p:nvGrpSpPr>
+          <p:cNvPr id="16" name="Group 15">
+            <a:extLst>
+              <a:ext uri="{FF2B5EF4-FFF2-40B4-BE49-F238E27FC236}">
+                <a16:creationId xmlns:a16="http://schemas.microsoft.com/office/drawing/2014/main" id="{C4C501B6-9F15-DB42-A676-8CA90EF72B68}"/>
+              </a:ext>
+            </a:extLst>
+          </p:cNvPr>
+          <p:cNvGrpSpPr/>
+          <p:nvPr/>
+        </p:nvGrpSpPr>
+        <p:grpSpPr>
+          <a:xfrm>
+            <a:off x="62157" y="64602"/>
+            <a:ext cx="303480" cy="232389"/>
+            <a:chOff x="923925" y="491830"/>
+            <a:chExt cx="1847850" cy="1414985"/>
+          </a:xfrm>
+          <a:solidFill>
+            <a:srgbClr val="F4F3F3"/>
+          </a:solidFill>
+        </p:grpSpPr>
+        <p:sp>
+          <p:nvSpPr>
+            <p:cNvPr id="13" name="Rounded Rectangle 12">
+              <a:extLst>
+                <a:ext uri="{FF2B5EF4-FFF2-40B4-BE49-F238E27FC236}">
+                  <a16:creationId xmlns:a16="http://schemas.microsoft.com/office/drawing/2014/main" id="{40F47046-7CED-8C43-AE69-27941DF21B9B}"/>
+                </a:ext>
+              </a:extLst>
+            </p:cNvPr>
+            <p:cNvSpPr/>
+            <p:nvPr/>
+          </p:nvSpPr>
+          <p:spPr>
+            <a:xfrm>
+              <a:off x="923925" y="491830"/>
+              <a:ext cx="1847850" cy="257175"/>
+            </a:xfrm>
+            <a:prstGeom prst="roundRect">
+              <a:avLst/>
+            </a:prstGeom>
+            <a:grpFill/>
+            <a:ln>
+              <a:noFill/>
+            </a:ln>
+          </p:spPr>
+          <p:style>
+            <a:lnRef idx="2">
+              <a:schemeClr val="accent1">
+                <a:shade val="50000"/>
+              </a:schemeClr>
+            </a:lnRef>
+            <a:fillRef idx="1">
+              <a:schemeClr val="accent1"/>
+            </a:fillRef>
+            <a:effectRef idx="0">
+              <a:schemeClr val="accent1"/>
+            </a:effectRef>
+            <a:fontRef idx="minor">
+              <a:schemeClr val="lt1"/>
+            </a:fontRef>
+          </p:style>
+          <p:txBody>
+            <a:bodyPr rtlCol="0" anchor="ctr"/>
+            <a:lstStyle/>
+            <a:p>
+              <a:pPr algn="ctr"/>
+              <a:endParaRPr lang="en-US" dirty="0"/>
+            </a:p>
+          </p:txBody>
+        </p:sp>
+        <p:sp>
+          <p:nvSpPr>
+            <p:cNvPr id="14" name="Rounded Rectangle 13">
+              <a:extLst>
+                <a:ext uri="{FF2B5EF4-FFF2-40B4-BE49-F238E27FC236}">
+                  <a16:creationId xmlns:a16="http://schemas.microsoft.com/office/drawing/2014/main" id="{2E1659D7-4845-1D48-8AA2-09987A2E945C}"/>
+                </a:ext>
+              </a:extLst>
+            </p:cNvPr>
+            <p:cNvSpPr/>
+            <p:nvPr/>
+          </p:nvSpPr>
+          <p:spPr>
+            <a:xfrm>
+              <a:off x="923925" y="1070735"/>
+              <a:ext cx="1847850" cy="257175"/>
+            </a:xfrm>
+            <a:prstGeom prst="roundRect">
+              <a:avLst/>
+            </a:prstGeom>
+            <a:grpFill/>
+            <a:ln>
+              <a:noFill/>
+            </a:ln>
+          </p:spPr>
+          <p:style>
+            <a:lnRef idx="2">
+              <a:schemeClr val="accent1">
+                <a:shade val="50000"/>
+              </a:schemeClr>
+            </a:lnRef>
+            <a:fillRef idx="1">
+              <a:schemeClr val="accent1"/>
+            </a:fillRef>
+            <a:effectRef idx="0">
+              <a:schemeClr val="accent1"/>
+            </a:effectRef>
+            <a:fontRef idx="minor">
+              <a:schemeClr val="lt1"/>
+            </a:fontRef>
+          </p:style>
+          <p:txBody>
+            <a:bodyPr rtlCol="0" anchor="ctr"/>
+            <a:lstStyle/>
+            <a:p>
+              <a:pPr algn="ctr"/>
+              <a:endParaRPr lang="en-US"/>
+            </a:p>
+          </p:txBody>
+        </p:sp>
+        <p:sp>
+          <p:nvSpPr>
+            <p:cNvPr id="15" name="Rounded Rectangle 14">
+              <a:extLst>
+                <a:ext uri="{FF2B5EF4-FFF2-40B4-BE49-F238E27FC236}">
+                  <a16:creationId xmlns:a16="http://schemas.microsoft.com/office/drawing/2014/main" id="{A6BB44F0-F0F7-BC4D-9D97-2A2346865665}"/>
+                </a:ext>
+              </a:extLst>
+            </p:cNvPr>
+            <p:cNvSpPr/>
+            <p:nvPr/>
+          </p:nvSpPr>
+          <p:spPr>
+            <a:xfrm>
+              <a:off x="923925" y="1649640"/>
+              <a:ext cx="1847850" cy="257175"/>
+            </a:xfrm>
+            <a:prstGeom prst="roundRect">
+              <a:avLst/>
+            </a:prstGeom>
+            <a:grpFill/>
+            <a:ln>
+              <a:noFill/>
+            </a:ln>
+          </p:spPr>
+          <p:style>
+            <a:lnRef idx="2">
+              <a:schemeClr val="accent1">
+                <a:shade val="50000"/>
+              </a:schemeClr>
+            </a:lnRef>
+            <a:fillRef idx="1">
+              <a:schemeClr val="accent1"/>
+            </a:fillRef>
+            <a:effectRef idx="0">
+              <a:schemeClr val="accent1"/>
+            </a:effectRef>
+            <a:fontRef idx="minor">
+              <a:schemeClr val="lt1"/>
+            </a:fontRef>
+          </p:style>
+          <p:txBody>
+            <a:bodyPr rtlCol="0" anchor="ctr"/>
+            <a:lstStyle/>
+            <a:p>
+              <a:pPr algn="ctr"/>
+              <a:endParaRPr lang="en-US"/>
+            </a:p>
+          </p:txBody>
+        </p:sp>
+      </p:grpSp>
+      <p:grpSp>
+        <p:nvGrpSpPr>
+          <p:cNvPr id="17" name="Group 16">
+            <a:extLst>
+              <a:ext uri="{FF2B5EF4-FFF2-40B4-BE49-F238E27FC236}">
+                <a16:creationId xmlns:a16="http://schemas.microsoft.com/office/drawing/2014/main" id="{0E87F6B9-A1BA-3643-8B47-3EAFA72188DD}"/>
+              </a:ext>
+            </a:extLst>
+          </p:cNvPr>
+          <p:cNvGrpSpPr/>
+          <p:nvPr/>
+        </p:nvGrpSpPr>
+        <p:grpSpPr>
+          <a:xfrm>
+            <a:off x="6487407" y="42037"/>
+            <a:ext cx="308436" cy="423704"/>
+            <a:chOff x="2183907" y="905522"/>
+            <a:chExt cx="2592279" cy="3561055"/>
+          </a:xfrm>
+        </p:grpSpPr>
+        <p:sp>
+          <p:nvSpPr>
+            <p:cNvPr id="18" name="Oval 17">
+              <a:extLst>
+                <a:ext uri="{FF2B5EF4-FFF2-40B4-BE49-F238E27FC236}">
+                  <a16:creationId xmlns:a16="http://schemas.microsoft.com/office/drawing/2014/main" id="{771F679F-407F-834D-9BEF-10D4E20A08A4}"/>
+                </a:ext>
+              </a:extLst>
+            </p:cNvPr>
+            <p:cNvSpPr/>
+            <p:nvPr/>
+          </p:nvSpPr>
+          <p:spPr>
+            <a:xfrm>
+              <a:off x="2183907" y="905522"/>
+              <a:ext cx="2592279" cy="2592279"/>
+            </a:xfrm>
+            <a:prstGeom prst="ellipse">
+              <a:avLst/>
+            </a:prstGeom>
+            <a:solidFill>
+              <a:srgbClr val="F4F3F3"/>
+            </a:solidFill>
+            <a:ln>
+              <a:noFill/>
+            </a:ln>
+          </p:spPr>
+          <p:style>
+            <a:lnRef idx="2">
+              <a:schemeClr val="accent1">
+                <a:shade val="50000"/>
+              </a:schemeClr>
+            </a:lnRef>
+            <a:fillRef idx="1">
+              <a:schemeClr val="accent1"/>
+            </a:fillRef>
+            <a:effectRef idx="0">
+              <a:schemeClr val="accent1"/>
+            </a:effectRef>
+            <a:fontRef idx="minor">
+              <a:schemeClr val="lt1"/>
+            </a:fontRef>
+          </p:style>
+          <p:txBody>
+            <a:bodyPr rtlCol="0" anchor="ctr"/>
+            <a:lstStyle/>
+            <a:p>
+              <a:pPr algn="ctr"/>
+              <a:endParaRPr lang="en-US"/>
+            </a:p>
+          </p:txBody>
+        </p:sp>
+        <p:sp>
+          <p:nvSpPr>
+            <p:cNvPr id="19" name="Pie 18">
+              <a:extLst>
+                <a:ext uri="{FF2B5EF4-FFF2-40B4-BE49-F238E27FC236}">
+                  <a16:creationId xmlns:a16="http://schemas.microsoft.com/office/drawing/2014/main" id="{C4F9775D-7B0E-3649-B910-7A4CC6B6F1F9}"/>
+                </a:ext>
+              </a:extLst>
+            </p:cNvPr>
+            <p:cNvSpPr/>
+            <p:nvPr/>
+          </p:nvSpPr>
+          <p:spPr>
+            <a:xfrm rot="5400000">
+              <a:off x="2511270" y="2529025"/>
+              <a:ext cx="1937552" cy="1937552"/>
+            </a:xfrm>
+            <a:prstGeom prst="pie">
+              <a:avLst>
+                <a:gd name="adj1" fmla="val 5406420"/>
+                <a:gd name="adj2" fmla="val 16200000"/>
+              </a:avLst>
+            </a:prstGeom>
+            <a:solidFill>
+              <a:srgbClr val="1F222A"/>
+            </a:solidFill>
+            <a:ln>
+              <a:noFill/>
+            </a:ln>
+          </p:spPr>
+          <p:style>
+            <a:lnRef idx="2">
+              <a:schemeClr val="accent1">
+                <a:shade val="50000"/>
+              </a:schemeClr>
+            </a:lnRef>
+            <a:fillRef idx="1">
+              <a:schemeClr val="accent1"/>
+            </a:fillRef>
+            <a:effectRef idx="0">
+              <a:schemeClr val="accent1"/>
+            </a:effectRef>
+            <a:fontRef idx="minor">
+              <a:schemeClr val="lt1"/>
+            </a:fontRef>
+          </p:style>
+          <p:txBody>
+            <a:bodyPr rtlCol="0" anchor="ctr"/>
+            <a:lstStyle/>
+            <a:p>
+              <a:pPr algn="ctr"/>
+              <a:endParaRPr lang="en-US">
+                <a:solidFill>
+                  <a:schemeClr val="tx1"/>
+                </a:solidFill>
+              </a:endParaRPr>
+            </a:p>
+          </p:txBody>
+        </p:sp>
+        <p:sp>
+          <p:nvSpPr>
+            <p:cNvPr id="20" name="Oval 19">
+              <a:extLst>
+                <a:ext uri="{FF2B5EF4-FFF2-40B4-BE49-F238E27FC236}">
+                  <a16:creationId xmlns:a16="http://schemas.microsoft.com/office/drawing/2014/main" id="{4089A298-372E-D64F-9B20-713E0E80A1A2}"/>
+                </a:ext>
+              </a:extLst>
+            </p:cNvPr>
+            <p:cNvSpPr/>
+            <p:nvPr/>
+          </p:nvSpPr>
+          <p:spPr>
+            <a:xfrm>
+              <a:off x="2816071" y="1304278"/>
+              <a:ext cx="1327950" cy="1327950"/>
+            </a:xfrm>
+            <a:prstGeom prst="ellipse">
+              <a:avLst/>
+            </a:prstGeom>
+            <a:solidFill>
+              <a:srgbClr val="1F222A"/>
+            </a:solidFill>
+            <a:ln>
+              <a:noFill/>
+            </a:ln>
+          </p:spPr>
+          <p:style>
+            <a:lnRef idx="2">
+              <a:schemeClr val="accent1">
+                <a:shade val="50000"/>
+              </a:schemeClr>
+            </a:lnRef>
+            <a:fillRef idx="1">
+              <a:schemeClr val="accent1"/>
+            </a:fillRef>
+            <a:effectRef idx="0">
+              <a:schemeClr val="accent1"/>
+            </a:effectRef>
+            <a:fontRef idx="minor">
+              <a:schemeClr val="lt1"/>
+            </a:fontRef>
+          </p:style>
+          <p:txBody>
+            <a:bodyPr rtlCol="0" anchor="ctr"/>
+            <a:lstStyle/>
+            <a:p>
+              <a:pPr algn="ctr"/>
+              <a:endParaRPr lang="en-US"/>
+            </a:p>
+          </p:txBody>
+        </p:sp>
+      </p:grpSp>
+      <p:sp>
+        <p:nvSpPr>
+          <p:cNvPr id="21" name="Rectangle 20">
+            <a:extLst>
+              <a:ext uri="{FF2B5EF4-FFF2-40B4-BE49-F238E27FC236}">
+                <a16:creationId xmlns:a16="http://schemas.microsoft.com/office/drawing/2014/main" id="{4726617E-E5AB-374A-AE8A-C509D5C2674B}"/>
+              </a:ext>
+            </a:extLst>
+          </p:cNvPr>
+          <p:cNvSpPr/>
+          <p:nvPr/>
+        </p:nvSpPr>
+        <p:spPr>
+          <a:xfrm>
+            <a:off x="-4" y="8333773"/>
+            <a:ext cx="6858004" cy="810228"/>
+          </a:xfrm>
+          <a:prstGeom prst="rect">
+            <a:avLst/>
+          </a:prstGeom>
+          <a:solidFill>
+            <a:srgbClr val="1F222A"/>
+          </a:solidFill>
+          <a:ln>
+            <a:noFill/>
+          </a:ln>
+        </p:spPr>
+        <p:style>
+          <a:lnRef idx="2">
+            <a:schemeClr val="accent1">
+              <a:shade val="50000"/>
+            </a:schemeClr>
+          </a:lnRef>
+          <a:fillRef idx="1">
+            <a:schemeClr val="accent1"/>
+          </a:fillRef>
+          <a:effectRef idx="0">
+            <a:schemeClr val="accent1"/>
+          </a:effectRef>
+          <a:fontRef idx="minor">
+            <a:schemeClr val="lt1"/>
+          </a:fontRef>
+        </p:style>
+        <p:txBody>
+          <a:bodyPr rtlCol="0" anchor="ctr"/>
+          <a:lstStyle/>
+          <a:p>
+            <a:pPr algn="ctr"/>
+            <a:endParaRPr lang="en-US" sz="2400"/>
+          </a:p>
+        </p:txBody>
+      </p:sp>
+      <p:pic>
+        <p:nvPicPr>
+          <p:cNvPr id="23" name="Picture 22" descr="A close up of a snow covered mountain&#10;&#10;Description automatically generated">
+            <a:extLst>
+              <a:ext uri="{FF2B5EF4-FFF2-40B4-BE49-F238E27FC236}">
+                <a16:creationId xmlns:a16="http://schemas.microsoft.com/office/drawing/2014/main" id="{3DE9D712-B6C4-2B48-A5D1-54249F5DBBD2}"/>
+              </a:ext>
+            </a:extLst>
+          </p:cNvPr>
+          <p:cNvPicPr>
+            <a:picLocks noChangeAspect="1"/>
+          </p:cNvPicPr>
+          <p:nvPr/>
+        </p:nvPicPr>
+        <p:blipFill rotWithShape="1">
+          <a:blip r:embed="rId2"/>
+          <a:srcRect t="26627"/>
+          <a:stretch/>
+        </p:blipFill>
+        <p:spPr>
+          <a:xfrm>
+            <a:off x="0" y="356802"/>
+            <a:ext cx="6858000" cy="2830442"/>
+          </a:xfrm>
+          <a:prstGeom prst="rect">
+            <a:avLst/>
+          </a:prstGeom>
+        </p:spPr>
+      </p:pic>
       <p:sp>
         <p:nvSpPr>
           <p:cNvPr id="24" name="Rectangle 23">
@@ -6564,86 +8282,6 @@
 </p:sld>
 </file>
 
-<file path=ppt/slides/slide3.xml><?xml version="1.0" encoding="utf-8"?>
-<p:sld xmlns:a="http://schemas.openxmlformats.org/drawingml/2006/main" xmlns:r="http://schemas.openxmlformats.org/officeDocument/2006/relationships" xmlns:p="http://schemas.openxmlformats.org/presentationml/2006/main">
-  <p:cSld>
-    <p:spTree>
-      <p:nvGrpSpPr>
-        <p:cNvPr id="1" name=""/>
-        <p:cNvGrpSpPr/>
-        <p:nvPr/>
-      </p:nvGrpSpPr>
-      <p:grpSpPr>
-        <a:xfrm>
-          <a:off x="0" y="0"/>
-          <a:ext cx="0" cy="0"/>
-          <a:chOff x="0" y="0"/>
-          <a:chExt cx="0" cy="0"/>
-        </a:xfrm>
-      </p:grpSpPr>
-      <p:sp>
-        <p:nvSpPr>
-          <p:cNvPr id="2" name="Title 1">
-            <a:extLst>
-              <a:ext uri="{FF2B5EF4-FFF2-40B4-BE49-F238E27FC236}">
-                <a16:creationId xmlns:a16="http://schemas.microsoft.com/office/drawing/2014/main" id="{4FD2B88D-C7CA-1040-BBF4-82A4F67A0642}"/>
-              </a:ext>
-            </a:extLst>
-          </p:cNvPr>
-          <p:cNvSpPr>
-            <a:spLocks noGrp="1"/>
-          </p:cNvSpPr>
-          <p:nvPr>
-            <p:ph type="title"/>
-          </p:nvPr>
-        </p:nvSpPr>
-        <p:spPr/>
-        <p:txBody>
-          <a:bodyPr/>
-          <a:lstStyle/>
-          <a:p>
-            <a:endParaRPr lang="en-US"/>
-          </a:p>
-        </p:txBody>
-      </p:sp>
-      <p:sp>
-        <p:nvSpPr>
-          <p:cNvPr id="3" name="Content Placeholder 2">
-            <a:extLst>
-              <a:ext uri="{FF2B5EF4-FFF2-40B4-BE49-F238E27FC236}">
-                <a16:creationId xmlns:a16="http://schemas.microsoft.com/office/drawing/2014/main" id="{45623723-3C6A-D240-96C6-DA4C14C6B5B6}"/>
-              </a:ext>
-            </a:extLst>
-          </p:cNvPr>
-          <p:cNvSpPr>
-            <a:spLocks noGrp="1"/>
-          </p:cNvSpPr>
-          <p:nvPr>
-            <p:ph idx="1"/>
-          </p:nvPr>
-        </p:nvSpPr>
-        <p:spPr/>
-        <p:txBody>
-          <a:bodyPr/>
-          <a:lstStyle/>
-          <a:p>
-            <a:endParaRPr lang="en-US"/>
-          </a:p>
-        </p:txBody>
-      </p:sp>
-    </p:spTree>
-    <p:extLst>
-      <p:ext uri="{BB962C8B-B14F-4D97-AF65-F5344CB8AC3E}">
-        <p14:creationId xmlns:p14="http://schemas.microsoft.com/office/powerpoint/2010/main" val="3924417066"/>
-      </p:ext>
-    </p:extLst>
-  </p:cSld>
-  <p:clrMapOvr>
-    <a:masterClrMapping/>
-  </p:clrMapOvr>
-</p:sld>
-</file>
-
 <file path=ppt/slides/slide4.xml><?xml version="1.0" encoding="utf-8"?>
 <p:sld xmlns:a="http://schemas.openxmlformats.org/drawingml/2006/main" xmlns:r="http://schemas.openxmlformats.org/officeDocument/2006/relationships" xmlns:p="http://schemas.openxmlformats.org/presentationml/2006/main">
   <p:cSld>
@@ -6666,6 +8304,86 @@
           <p:cNvPr id="2" name="Title 1">
             <a:extLst>
               <a:ext uri="{FF2B5EF4-FFF2-40B4-BE49-F238E27FC236}">
+                <a16:creationId xmlns:a16="http://schemas.microsoft.com/office/drawing/2014/main" id="{4FD2B88D-C7CA-1040-BBF4-82A4F67A0642}"/>
+              </a:ext>
+            </a:extLst>
+          </p:cNvPr>
+          <p:cNvSpPr>
+            <a:spLocks noGrp="1"/>
+          </p:cNvSpPr>
+          <p:nvPr>
+            <p:ph type="title"/>
+          </p:nvPr>
+        </p:nvSpPr>
+        <p:spPr/>
+        <p:txBody>
+          <a:bodyPr/>
+          <a:lstStyle/>
+          <a:p>
+            <a:endParaRPr lang="en-US"/>
+          </a:p>
+        </p:txBody>
+      </p:sp>
+      <p:sp>
+        <p:nvSpPr>
+          <p:cNvPr id="3" name="Content Placeholder 2">
+            <a:extLst>
+              <a:ext uri="{FF2B5EF4-FFF2-40B4-BE49-F238E27FC236}">
+                <a16:creationId xmlns:a16="http://schemas.microsoft.com/office/drawing/2014/main" id="{45623723-3C6A-D240-96C6-DA4C14C6B5B6}"/>
+              </a:ext>
+            </a:extLst>
+          </p:cNvPr>
+          <p:cNvSpPr>
+            <a:spLocks noGrp="1"/>
+          </p:cNvSpPr>
+          <p:nvPr>
+            <p:ph idx="1"/>
+          </p:nvPr>
+        </p:nvSpPr>
+        <p:spPr/>
+        <p:txBody>
+          <a:bodyPr/>
+          <a:lstStyle/>
+          <a:p>
+            <a:endParaRPr lang="en-US"/>
+          </a:p>
+        </p:txBody>
+      </p:sp>
+    </p:spTree>
+    <p:extLst>
+      <p:ext uri="{BB962C8B-B14F-4D97-AF65-F5344CB8AC3E}">
+        <p14:creationId xmlns:p14="http://schemas.microsoft.com/office/powerpoint/2010/main" val="3924417066"/>
+      </p:ext>
+    </p:extLst>
+  </p:cSld>
+  <p:clrMapOvr>
+    <a:masterClrMapping/>
+  </p:clrMapOvr>
+</p:sld>
+</file>
+
+<file path=ppt/slides/slide5.xml><?xml version="1.0" encoding="utf-8"?>
+<p:sld xmlns:a="http://schemas.openxmlformats.org/drawingml/2006/main" xmlns:r="http://schemas.openxmlformats.org/officeDocument/2006/relationships" xmlns:p="http://schemas.openxmlformats.org/presentationml/2006/main">
+  <p:cSld>
+    <p:spTree>
+      <p:nvGrpSpPr>
+        <p:cNvPr id="1" name=""/>
+        <p:cNvGrpSpPr/>
+        <p:nvPr/>
+      </p:nvGrpSpPr>
+      <p:grpSpPr>
+        <a:xfrm>
+          <a:off x="0" y="0"/>
+          <a:ext cx="0" cy="0"/>
+          <a:chOff x="0" y="0"/>
+          <a:chExt cx="0" cy="0"/>
+        </a:xfrm>
+      </p:grpSpPr>
+      <p:sp>
+        <p:nvSpPr>
+          <p:cNvPr id="2" name="Title 1">
+            <a:extLst>
+              <a:ext uri="{FF2B5EF4-FFF2-40B4-BE49-F238E27FC236}">
                 <a16:creationId xmlns:a16="http://schemas.microsoft.com/office/drawing/2014/main" id="{9AFDD423-E0B0-BA4C-BA56-C23816D4DCF2}"/>
               </a:ext>
             </a:extLst>
@@ -7021,7 +8739,7 @@
 </p:sld>
 </file>
 
-<file path=ppt/slides/slide5.xml><?xml version="1.0" encoding="utf-8"?>
+<file path=ppt/slides/slide6.xml><?xml version="1.0" encoding="utf-8"?>
 <p:sld xmlns:a="http://schemas.openxmlformats.org/drawingml/2006/main" xmlns:r="http://schemas.openxmlformats.org/officeDocument/2006/relationships" xmlns:p="http://schemas.openxmlformats.org/presentationml/2006/main">
   <p:cSld>
     <p:spTree>

</xml_diff>